<commit_message>
replaced CSV file in test docs
</commit_message>
<xml_diff>
--- a/test-docs/15.pptx
+++ b/test-docs/15.pptx
@@ -7,17 +7,16 @@
     <p:sldMasterId id="2147483687" r:id="rId3"/>
   </p:sldMasterIdLst>
   <p:notesMasterIdLst>
-    <p:notesMasterId r:id="rId12"/>
+    <p:notesMasterId r:id="rId11"/>
   </p:notesMasterIdLst>
   <p:sldIdLst>
-    <p:sldId id="403" r:id="rId4"/>
-    <p:sldId id="611" r:id="rId5"/>
-    <p:sldId id="626" r:id="rId6"/>
-    <p:sldId id="581" r:id="rId7"/>
-    <p:sldId id="443" r:id="rId8"/>
-    <p:sldId id="407" r:id="rId9"/>
-    <p:sldId id="408" r:id="rId10"/>
-    <p:sldId id="406" r:id="rId11"/>
+    <p:sldId id="611" r:id="rId4"/>
+    <p:sldId id="626" r:id="rId5"/>
+    <p:sldId id="581" r:id="rId6"/>
+    <p:sldId id="443" r:id="rId7"/>
+    <p:sldId id="407" r:id="rId8"/>
+    <p:sldId id="408" r:id="rId9"/>
+    <p:sldId id="406" r:id="rId10"/>
   </p:sldIdLst>
   <p:sldSz cx="9144000" cy="6858000" type="screen4x3"/>
   <p:notesSz cx="9601200" cy="7315200"/>
@@ -569,7 +568,7 @@
             <a:fld id="{9BAC0AB0-AD3E-47C1-B70B-9D9BFCDECF25}" type="slidenum">
               <a:rPr lang="en-US" smtClean="0"/>
               <a:pPr/>
-              <a:t>2</a:t>
+              <a:t>1</a:t>
             </a:fld>
             <a:endParaRPr lang="en-US"/>
           </a:p>
@@ -634,7 +633,7 @@
               </a14:hiddenFill>
             </a:ext>
             <a:ext uri="{FAA26D3D-D897-4be2-8F04-BA451C77F1D7}">
-              <ma14:placeholderFlag xmlns:ma14="http://schemas.microsoft.com/office/mac/drawingml/2011/main" xmlns="" val="1"/>
+              <ma14:placeholderFlag xmlns="" xmlns:ma14="http://schemas.microsoft.com/office/mac/drawingml/2011/main" val="1"/>
             </a:ext>
           </a:extLst>
         </p:spPr>
@@ -839,7 +838,7 @@
                 <a:latin typeface="Calibri" charset="0"/>
               </a:rPr>
               <a:pPr eaLnBrk="1" hangingPunct="1"/>
-              <a:t>5</a:t>
+              <a:t>4</a:t>
             </a:fld>
             <a:endParaRPr lang="en-US" sz="1200">
               <a:latin typeface="Calibri" charset="0"/>
@@ -9981,206 +9980,6 @@
           <a:chExt cx="0" cy="0"/>
         </a:xfrm>
       </p:grpSpPr>
-      <p:pic>
-        <p:nvPicPr>
-          <p:cNvPr id="2050" name="Picture 2" descr="Image result for civil engineering structures pictures"/>
-          <p:cNvPicPr>
-            <a:picLocks noChangeAspect="1" noChangeArrowheads="1"/>
-          </p:cNvPicPr>
-          <p:nvPr/>
-        </p:nvPicPr>
-        <p:blipFill>
-          <a:blip r:embed="rId2">
-            <a:extLst>
-              <a:ext uri="{28A0092B-C50C-407E-A947-70E740481C1C}">
-                <a14:useLocalDpi xmlns:a14="http://schemas.microsoft.com/office/drawing/2010/main" val="0"/>
-              </a:ext>
-            </a:extLst>
-          </a:blip>
-          <a:srcRect/>
-          <a:stretch>
-            <a:fillRect/>
-          </a:stretch>
-        </p:blipFill>
-        <p:spPr bwMode="auto">
-          <a:xfrm>
-            <a:off x="379916" y="0"/>
-            <a:ext cx="8452493" cy="6833286"/>
-          </a:xfrm>
-          <a:prstGeom prst="rect">
-            <a:avLst/>
-          </a:prstGeom>
-          <a:noFill/>
-          <a:extLst>
-            <a:ext uri="{909E8E84-426E-40DD-AFC4-6F175D3DCCD1}">
-              <a14:hiddenFill xmlns:a14="http://schemas.microsoft.com/office/drawing/2010/main">
-                <a:solidFill>
-                  <a:srgbClr val="FFFFFF"/>
-                </a:solidFill>
-              </a14:hiddenFill>
-            </a:ext>
-          </a:extLst>
-        </p:spPr>
-      </p:pic>
-      <p:sp>
-        <p:nvSpPr>
-          <p:cNvPr id="2" name="Title 1"/>
-          <p:cNvSpPr>
-            <a:spLocks noGrp="1"/>
-          </p:cNvSpPr>
-          <p:nvPr>
-            <p:ph type="ctrTitle"/>
-          </p:nvPr>
-        </p:nvSpPr>
-        <p:spPr>
-          <a:xfrm>
-            <a:off x="379915" y="609600"/>
-            <a:ext cx="8452493" cy="1219201"/>
-          </a:xfrm>
-          <a:solidFill>
-            <a:schemeClr val="bg1">
-              <a:alpha val="0"/>
-            </a:schemeClr>
-          </a:solidFill>
-        </p:spPr>
-        <p:txBody>
-          <a:bodyPr>
-            <a:noAutofit/>
-          </a:bodyPr>
-          <a:lstStyle/>
-          <a:p>
-            <a:r>
-              <a:rPr lang="en-US" sz="6600" dirty="0">
-                <a:solidFill>
-                  <a:schemeClr val="bg1"/>
-                </a:solidFill>
-                <a:latin typeface="Bookman Old Style" pitchFamily="18" charset="0"/>
-              </a:rPr>
-              <a:t>WELCOME TO </a:t>
-            </a:r>
-            <a:br>
-              <a:rPr lang="en-US" sz="6600" dirty="0">
-                <a:solidFill>
-                  <a:schemeClr val="bg1"/>
-                </a:solidFill>
-                <a:latin typeface="Bookman Old Style" pitchFamily="18" charset="0"/>
-              </a:rPr>
-            </a:br>
-            <a:r>
-              <a:rPr lang="en-US" sz="6600" dirty="0">
-                <a:solidFill>
-                  <a:schemeClr val="bg1"/>
-                </a:solidFill>
-                <a:latin typeface="Bookman Old Style" pitchFamily="18" charset="0"/>
-              </a:rPr>
-              <a:t>CEE 202</a:t>
-            </a:r>
-          </a:p>
-        </p:txBody>
-      </p:sp>
-    </p:spTree>
-  </p:cSld>
-  <p:clrMapOvr>
-    <a:masterClrMapping/>
-  </p:clrMapOvr>
-  <p:timing>
-    <p:tnLst>
-      <p:par>
-        <p:cTn id="1" dur="indefinite" restart="never" nodeType="tmRoot">
-          <p:childTnLst>
-            <p:seq concurrent="1" nextAc="seek">
-              <p:cTn id="2" dur="indefinite" nodeType="mainSeq">
-                <p:childTnLst>
-                  <p:par>
-                    <p:cTn id="3" fill="hold">
-                      <p:stCondLst>
-                        <p:cond delay="indefinite"/>
-                      </p:stCondLst>
-                      <p:childTnLst>
-                        <p:par>
-                          <p:cTn id="4" fill="hold">
-                            <p:stCondLst>
-                              <p:cond delay="0"/>
-                            </p:stCondLst>
-                            <p:childTnLst>
-                              <p:par>
-                                <p:cTn id="5" presetID="1" presetClass="entr" presetSubtype="0" fill="hold" grpId="0" nodeType="clickEffect">
-                                  <p:stCondLst>
-                                    <p:cond delay="0"/>
-                                  </p:stCondLst>
-                                  <p:childTnLst>
-                                    <p:set>
-                                      <p:cBhvr>
-                                        <p:cTn id="6" dur="1" fill="hold">
-                                          <p:stCondLst>
-                                            <p:cond delay="0"/>
-                                          </p:stCondLst>
-                                        </p:cTn>
-                                        <p:tgtEl>
-                                          <p:spTgt spid="2"/>
-                                        </p:tgtEl>
-                                        <p:attrNameLst>
-                                          <p:attrName>style.visibility</p:attrName>
-                                        </p:attrNameLst>
-                                      </p:cBhvr>
-                                      <p:to>
-                                        <p:strVal val="visible"/>
-                                      </p:to>
-                                    </p:set>
-                                  </p:childTnLst>
-                                </p:cTn>
-                              </p:par>
-                            </p:childTnLst>
-                          </p:cTn>
-                        </p:par>
-                      </p:childTnLst>
-                    </p:cTn>
-                  </p:par>
-                </p:childTnLst>
-              </p:cTn>
-              <p:prevCondLst>
-                <p:cond evt="onPrev" delay="0">
-                  <p:tgtEl>
-                    <p:sldTgt/>
-                  </p:tgtEl>
-                </p:cond>
-              </p:prevCondLst>
-              <p:nextCondLst>
-                <p:cond evt="onNext" delay="0">
-                  <p:tgtEl>
-                    <p:sldTgt/>
-                  </p:tgtEl>
-                </p:cond>
-              </p:nextCondLst>
-            </p:seq>
-          </p:childTnLst>
-        </p:cTn>
-      </p:par>
-    </p:tnLst>
-    <p:bldLst>
-      <p:bldP spid="2" grpId="0" animBg="1"/>
-    </p:bldLst>
-  </p:timing>
-</p:sld>
-</file>
-
-<file path=ppt/slides/slide2.xml><?xml version="1.0" encoding="utf-8"?>
-<p:sld xmlns:a="http://schemas.openxmlformats.org/drawingml/2006/main" xmlns:r="http://schemas.openxmlformats.org/officeDocument/2006/relationships" xmlns:p="http://schemas.openxmlformats.org/presentationml/2006/main">
-  <p:cSld>
-    <p:spTree>
-      <p:nvGrpSpPr>
-        <p:cNvPr id="1" name=""/>
-        <p:cNvGrpSpPr/>
-        <p:nvPr/>
-      </p:nvGrpSpPr>
-      <p:grpSpPr>
-        <a:xfrm>
-          <a:off x="0" y="0"/>
-          <a:ext cx="0" cy="0"/>
-          <a:chOff x="0" y="0"/>
-          <a:chExt cx="0" cy="0"/>
-        </a:xfrm>
-      </p:grpSpPr>
       <p:sp>
         <p:nvSpPr>
           <p:cNvPr id="2" name="Title 1">
@@ -10263,7 +10062,7 @@
             <a:fld id="{99EB6A80-5F3A-48F8-9A6D-FBAB30EAD4DB}" type="slidenum">
               <a:rPr lang="en-US" smtClean="0"/>
               <a:pPr/>
-              <a:t>2</a:t>
+              <a:t>1</a:t>
             </a:fld>
             <a:endParaRPr lang="en-US"/>
           </a:p>
@@ -10537,7 +10336,7 @@
 </p:sld>
 </file>
 
-<file path=ppt/slides/slide3.xml><?xml version="1.0" encoding="utf-8"?>
+<file path=ppt/slides/slide2.xml><?xml version="1.0" encoding="utf-8"?>
 <p:sld xmlns:a="http://schemas.openxmlformats.org/drawingml/2006/main" xmlns:r="http://schemas.openxmlformats.org/officeDocument/2006/relationships" xmlns:p="http://schemas.openxmlformats.org/presentationml/2006/main">
   <p:cSld>
     <p:spTree>
@@ -10608,7 +10407,7 @@
             <a:fld id="{99EB6A80-5F3A-48F8-9A6D-FBAB30EAD4DB}" type="slidenum">
               <a:rPr lang="en-US" smtClean="0"/>
               <a:pPr/>
-              <a:t>3</a:t>
+              <a:t>2</a:t>
             </a:fld>
             <a:endParaRPr lang="en-US"/>
           </a:p>
@@ -10777,7 +10576,7 @@
 </p:sld>
 </file>
 
-<file path=ppt/slides/slide4.xml><?xml version="1.0" encoding="utf-8"?>
+<file path=ppt/slides/slide3.xml><?xml version="1.0" encoding="utf-8"?>
 <p:sld xmlns:a="http://schemas.openxmlformats.org/drawingml/2006/main" xmlns:r="http://schemas.openxmlformats.org/officeDocument/2006/relationships" xmlns:p="http://schemas.openxmlformats.org/presentationml/2006/main">
   <p:cSld>
     <p:spTree>
@@ -10918,7 +10717,7 @@
             <a:fld id="{99EB6A80-5F3A-48F8-9A6D-FBAB30EAD4DB}" type="slidenum">
               <a:rPr lang="en-US" smtClean="0"/>
               <a:pPr/>
-              <a:t>4</a:t>
+              <a:t>3</a:t>
             </a:fld>
             <a:endParaRPr lang="en-US"/>
           </a:p>
@@ -11003,7 +10802,7 @@
 </p:sld>
 </file>
 
-<file path=ppt/slides/slide5.xml><?xml version="1.0" encoding="utf-8"?>
+<file path=ppt/slides/slide4.xml><?xml version="1.0" encoding="utf-8"?>
 <p:sld xmlns:a="http://schemas.openxmlformats.org/drawingml/2006/main" xmlns:r="http://schemas.openxmlformats.org/officeDocument/2006/relationships" xmlns:p="http://schemas.openxmlformats.org/presentationml/2006/main">
   <p:cSld>
     <p:spTree>
@@ -11272,7 +11071,7 @@
                 <a:latin typeface="Calibri" charset="0"/>
               </a:rPr>
               <a:pPr eaLnBrk="1" hangingPunct="1"/>
-              <a:t>5</a:t>
+              <a:t>4</a:t>
             </a:fld>
             <a:endParaRPr lang="en-US" sz="1200" dirty="0">
               <a:solidFill>
@@ -11551,6 +11350,270 @@
 </p:sld>
 </file>
 
+<file path=ppt/slides/slide5.xml><?xml version="1.0" encoding="utf-8"?>
+<p:sld xmlns:a="http://schemas.openxmlformats.org/drawingml/2006/main" xmlns:r="http://schemas.openxmlformats.org/officeDocument/2006/relationships" xmlns:p="http://schemas.openxmlformats.org/presentationml/2006/main">
+  <p:cSld>
+    <p:spTree>
+      <p:nvGrpSpPr>
+        <p:cNvPr id="1" name=""/>
+        <p:cNvGrpSpPr/>
+        <p:nvPr/>
+      </p:nvGrpSpPr>
+      <p:grpSpPr>
+        <a:xfrm>
+          <a:off x="0" y="0"/>
+          <a:ext cx="0" cy="0"/>
+          <a:chOff x="0" y="0"/>
+          <a:chExt cx="0" cy="0"/>
+        </a:xfrm>
+      </p:grpSpPr>
+      <p:sp>
+        <p:nvSpPr>
+          <p:cNvPr id="2" name="Title 1"/>
+          <p:cNvSpPr>
+            <a:spLocks noGrp="1"/>
+          </p:cNvSpPr>
+          <p:nvPr>
+            <p:ph type="title"/>
+          </p:nvPr>
+        </p:nvSpPr>
+        <p:spPr/>
+        <p:txBody>
+          <a:bodyPr/>
+          <a:lstStyle/>
+          <a:p>
+            <a:r>
+              <a:rPr lang="en-US" dirty="0"/>
+              <a:t>Risk</a:t>
+            </a:r>
+          </a:p>
+        </p:txBody>
+      </p:sp>
+      <p:sp>
+        <p:nvSpPr>
+          <p:cNvPr id="3" name="Date Placeholder 2"/>
+          <p:cNvSpPr>
+            <a:spLocks noGrp="1"/>
+          </p:cNvSpPr>
+          <p:nvPr>
+            <p:ph type="dt" sz="half" idx="10"/>
+          </p:nvPr>
+        </p:nvSpPr>
+        <p:spPr>
+          <a:xfrm>
+            <a:off x="6400800" y="6356350"/>
+            <a:ext cx="2289048" cy="365760"/>
+          </a:xfrm>
+        </p:spPr>
+        <p:txBody>
+          <a:bodyPr/>
+          <a:lstStyle/>
+          <a:p>
+            <a:fld id="{F3563AE4-DA3B-43C7-9491-93F20296CE92}" type="datetime1">
+              <a:rPr lang="en-US" smtClean="0"/>
+              <a:pPr/>
+              <a:t>10/2/2024</a:t>
+            </a:fld>
+            <a:endParaRPr lang="en-US"/>
+          </a:p>
+        </p:txBody>
+      </p:sp>
+      <p:sp>
+        <p:nvSpPr>
+          <p:cNvPr id="4" name="Slide Number Placeholder 3"/>
+          <p:cNvSpPr>
+            <a:spLocks noGrp="1"/>
+          </p:cNvSpPr>
+          <p:nvPr>
+            <p:ph type="sldNum" sz="quarter" idx="12"/>
+          </p:nvPr>
+        </p:nvSpPr>
+        <p:spPr>
+          <a:xfrm>
+            <a:off x="612648" y="6356350"/>
+            <a:ext cx="1981200" cy="365760"/>
+          </a:xfrm>
+        </p:spPr>
+        <p:txBody>
+          <a:bodyPr/>
+          <a:lstStyle/>
+          <a:p>
+            <a:fld id="{8CB62BB1-93B2-41D9-A860-4B60755F311C}" type="slidenum">
+              <a:rPr lang="en-US" dirty="0" smtClean="0"/>
+              <a:pPr/>
+              <a:t>5</a:t>
+            </a:fld>
+            <a:endParaRPr lang="en-US" dirty="0"/>
+          </a:p>
+        </p:txBody>
+      </p:sp>
+      <p:sp>
+        <p:nvSpPr>
+          <p:cNvPr id="5" name="Content Placeholder 4"/>
+          <p:cNvSpPr>
+            <a:spLocks noGrp="1"/>
+          </p:cNvSpPr>
+          <p:nvPr>
+            <p:ph sz="quarter" idx="1"/>
+          </p:nvPr>
+        </p:nvSpPr>
+        <p:spPr>
+          <a:xfrm>
+            <a:off x="457200" y="1277034"/>
+            <a:ext cx="8229600" cy="4525963"/>
+          </a:xfrm>
+        </p:spPr>
+        <p:txBody>
+          <a:bodyPr>
+            <a:noAutofit/>
+          </a:bodyPr>
+          <a:lstStyle/>
+          <a:p>
+            <a:r>
+              <a:rPr lang="en-US" sz="2400" dirty="0">
+                <a:latin typeface="Calisto MT" pitchFamily="18" charset="0"/>
+              </a:rPr>
+              <a:t>An engineer asks:</a:t>
+            </a:r>
+          </a:p>
+          <a:p>
+            <a:pPr lvl="4"/>
+            <a:r>
+              <a:rPr lang="en-US" sz="2400" dirty="0">
+                <a:latin typeface="Calisto MT" pitchFamily="18" charset="0"/>
+              </a:rPr>
+              <a:t>What can go wrong?</a:t>
+            </a:r>
+          </a:p>
+          <a:p>
+            <a:pPr lvl="4"/>
+            <a:r>
+              <a:rPr lang="en-US" sz="2400" dirty="0">
+                <a:latin typeface="Calisto MT" pitchFamily="18" charset="0"/>
+              </a:rPr>
+              <a:t>How </a:t>
+            </a:r>
+            <a:r>
+              <a:rPr lang="en-US" sz="2400" dirty="0">
+                <a:solidFill>
+                  <a:srgbClr val="FF0000"/>
+                </a:solidFill>
+                <a:latin typeface="Calisto MT" pitchFamily="18" charset="0"/>
+              </a:rPr>
+              <a:t>likely</a:t>
+            </a:r>
+            <a:r>
+              <a:rPr lang="en-US" sz="2400" dirty="0">
+                <a:latin typeface="Calisto MT" pitchFamily="18" charset="0"/>
+              </a:rPr>
+              <a:t> are the potential problems to occur?</a:t>
+            </a:r>
+          </a:p>
+          <a:p>
+            <a:pPr lvl="4"/>
+            <a:r>
+              <a:rPr lang="en-US" sz="2400" dirty="0">
+                <a:latin typeface="Calisto MT" pitchFamily="18" charset="0"/>
+              </a:rPr>
+              <a:t>How severe might the potential problems be?</a:t>
+            </a:r>
+          </a:p>
+          <a:p>
+            <a:pPr lvl="4"/>
+            <a:r>
+              <a:rPr lang="en-US" sz="2400" dirty="0">
+                <a:latin typeface="Calisto MT" pitchFamily="18" charset="0"/>
+              </a:rPr>
+              <a:t>Is the risk of potential problems tolerable?</a:t>
+            </a:r>
+          </a:p>
+          <a:p>
+            <a:pPr lvl="4"/>
+            <a:r>
+              <a:rPr lang="en-US" sz="2400" dirty="0">
+                <a:latin typeface="Calisto MT" pitchFamily="18" charset="0"/>
+              </a:rPr>
+              <a:t>What can/should be done to lessen the risk?</a:t>
+            </a:r>
+          </a:p>
+          <a:p>
+            <a:pPr lvl="4"/>
+            <a:r>
+              <a:rPr lang="en-US" sz="2400" dirty="0">
+                <a:latin typeface="Calisto MT" pitchFamily="18" charset="0"/>
+              </a:rPr>
+              <a:t>Do we need to consider environmental change in future designs?</a:t>
+            </a:r>
+          </a:p>
+          <a:p>
+            <a:pPr lvl="4"/>
+            <a:r>
+              <a:rPr lang="en-US" sz="2400" dirty="0">
+                <a:latin typeface="Calisto MT" pitchFamily="18" charset="0"/>
+              </a:rPr>
+              <a:t>Do we need to upgrade our current infrastructure?</a:t>
+            </a:r>
+          </a:p>
+          <a:p>
+            <a:endParaRPr lang="en-US" sz="2400" dirty="0">
+              <a:latin typeface="Calisto MT" pitchFamily="18" charset="0"/>
+            </a:endParaRPr>
+          </a:p>
+        </p:txBody>
+      </p:sp>
+      <p:sp>
+        <p:nvSpPr>
+          <p:cNvPr id="6" name="TextBox 5">
+            <a:extLst>
+              <a:ext uri="{FF2B5EF4-FFF2-40B4-BE49-F238E27FC236}">
+                <a16:creationId xmlns:a16="http://schemas.microsoft.com/office/drawing/2014/main" id="{CBA95C78-7784-4976-9D51-7181A7C2A85A}"/>
+              </a:ext>
+            </a:extLst>
+          </p:cNvPr>
+          <p:cNvSpPr txBox="1"/>
+          <p:nvPr/>
+        </p:nvSpPr>
+        <p:spPr>
+          <a:xfrm>
+            <a:off x="533400" y="5956240"/>
+            <a:ext cx="7696200" cy="400110"/>
+          </a:xfrm>
+          <a:prstGeom prst="rect">
+            <a:avLst/>
+          </a:prstGeom>
+          <a:solidFill>
+            <a:srgbClr val="FFC000"/>
+          </a:solidFill>
+        </p:spPr>
+        <p:txBody>
+          <a:bodyPr wrap="square" rtlCol="0">
+            <a:spAutoFit/>
+          </a:bodyPr>
+          <a:lstStyle/>
+          <a:p>
+            <a:pPr algn="ctr"/>
+            <a:r>
+              <a:rPr lang="en-US" sz="2000" dirty="0">
+                <a:latin typeface="Calisto MT" panose="02040603050505030304" pitchFamily="18" charset="0"/>
+              </a:rPr>
+              <a:t>An engineer’s responsibility is under scrutiny if things go wrong.</a:t>
+            </a:r>
+          </a:p>
+        </p:txBody>
+      </p:sp>
+    </p:spTree>
+    <p:extLst>
+      <p:ext uri="{BB962C8B-B14F-4D97-AF65-F5344CB8AC3E}">
+        <p14:creationId xmlns:p14="http://schemas.microsoft.com/office/powerpoint/2010/main" val="2491821266"/>
+      </p:ext>
+    </p:extLst>
+  </p:cSld>
+  <p:clrMapOvr>
+    <a:masterClrMapping/>
+  </p:clrMapOvr>
+</p:sld>
+</file>
+
 <file path=ppt/slides/slide6.xml><?xml version="1.0" encoding="utf-8"?>
 <p:sld xmlns:a="http://schemas.openxmlformats.org/drawingml/2006/main" xmlns:r="http://schemas.openxmlformats.org/officeDocument/2006/relationships" xmlns:p="http://schemas.openxmlformats.org/presentationml/2006/main">
   <p:cSld>
@@ -11585,7 +11648,7 @@
           <a:p>
             <a:r>
               <a:rPr lang="en-US" dirty="0"/>
-              <a:t>Risk</a:t>
+              <a:t>Risk Based Design</a:t>
             </a:r>
           </a:p>
         </p:txBody>
@@ -11660,152 +11723,73 @@
         </p:nvSpPr>
         <p:spPr>
           <a:xfrm>
-            <a:off x="457200" y="1277034"/>
-            <a:ext cx="8229600" cy="4525963"/>
+            <a:off x="612648" y="1524000"/>
+            <a:ext cx="7540752" cy="4632960"/>
           </a:xfrm>
         </p:spPr>
         <p:txBody>
-          <a:bodyPr>
-            <a:noAutofit/>
-          </a:bodyPr>
-          <a:lstStyle/>
-          <a:p>
-            <a:r>
-              <a:rPr lang="en-US" sz="2400" dirty="0">
+          <a:bodyPr/>
+          <a:lstStyle/>
+          <a:p>
+            <a:r>
+              <a:rPr lang="en-US" dirty="0">
                 <a:latin typeface="Calisto MT" pitchFamily="18" charset="0"/>
               </a:rPr>
-              <a:t>An engineer asks:</a:t>
-            </a:r>
-          </a:p>
-          <a:p>
-            <a:pPr lvl="4"/>
-            <a:r>
-              <a:rPr lang="en-US" sz="2400" dirty="0">
+              <a:t>A risk based design of an engineering project involves </a:t>
+            </a:r>
+            <a:r>
+              <a:rPr lang="en-US" dirty="0">
+                <a:solidFill>
+                  <a:srgbClr val="0070C0"/>
+                </a:solidFill>
                 <a:latin typeface="Calisto MT" pitchFamily="18" charset="0"/>
               </a:rPr>
-              <a:t>What can go wrong?</a:t>
-            </a:r>
-          </a:p>
-          <a:p>
-            <a:pPr lvl="4"/>
-            <a:r>
-              <a:rPr lang="en-US" sz="2400" dirty="0">
+              <a:t>making decisions </a:t>
+            </a:r>
+            <a:r>
+              <a:rPr lang="en-US" dirty="0">
                 <a:latin typeface="Calisto MT" pitchFamily="18" charset="0"/>
               </a:rPr>
-              <a:t>How </a:t>
-            </a:r>
-            <a:r>
-              <a:rPr lang="en-US" sz="2400" dirty="0">
+              <a:t>based on quantitative risk-benefit trade offs. </a:t>
+            </a:r>
+          </a:p>
+          <a:p>
+            <a:endParaRPr lang="en-US" dirty="0">
+              <a:latin typeface="Calisto MT" pitchFamily="18" charset="0"/>
+            </a:endParaRPr>
+          </a:p>
+          <a:p>
+            <a:r>
+              <a:rPr lang="en-US" dirty="0">
+                <a:latin typeface="Calisto MT" pitchFamily="18" charset="0"/>
+              </a:rPr>
+              <a:t>This involves applying the concepts and methods of </a:t>
+            </a:r>
+            <a:r>
+              <a:rPr lang="en-US" dirty="0">
                 <a:solidFill>
                   <a:srgbClr val="FF0000"/>
                 </a:solidFill>
                 <a:latin typeface="Calisto MT" pitchFamily="18" charset="0"/>
               </a:rPr>
-              <a:t>likely</a:t>
-            </a:r>
-            <a:r>
-              <a:rPr lang="en-US" sz="2400" dirty="0">
+              <a:t>probability and statistics</a:t>
+            </a:r>
+            <a:r>
+              <a:rPr lang="en-US" dirty="0">
                 <a:latin typeface="Calisto MT" pitchFamily="18" charset="0"/>
               </a:rPr>
-              <a:t> are the potential problems to occur?</a:t>
-            </a:r>
-          </a:p>
-          <a:p>
-            <a:pPr lvl="4"/>
-            <a:r>
-              <a:rPr lang="en-US" sz="2400" dirty="0">
-                <a:latin typeface="Calisto MT" pitchFamily="18" charset="0"/>
-              </a:rPr>
-              <a:t>How severe might the potential problems be?</a:t>
-            </a:r>
-          </a:p>
-          <a:p>
-            <a:pPr lvl="4"/>
-            <a:r>
-              <a:rPr lang="en-US" sz="2400" dirty="0">
-                <a:latin typeface="Calisto MT" pitchFamily="18" charset="0"/>
-              </a:rPr>
-              <a:t>Is the risk of potential problems tolerable?</a:t>
-            </a:r>
-          </a:p>
-          <a:p>
-            <a:pPr lvl="4"/>
-            <a:r>
-              <a:rPr lang="en-US" sz="2400" dirty="0">
-                <a:latin typeface="Calisto MT" pitchFamily="18" charset="0"/>
-              </a:rPr>
-              <a:t>What can/should be done to lessen the risk?</a:t>
-            </a:r>
-          </a:p>
-          <a:p>
-            <a:pPr lvl="4"/>
-            <a:r>
-              <a:rPr lang="en-US" sz="2400" dirty="0">
-                <a:latin typeface="Calisto MT" pitchFamily="18" charset="0"/>
-              </a:rPr>
-              <a:t>Do we need to consider environmental change in future designs?</a:t>
-            </a:r>
-          </a:p>
-          <a:p>
-            <a:pPr lvl="4"/>
-            <a:r>
-              <a:rPr lang="en-US" sz="2400" dirty="0">
-                <a:latin typeface="Calisto MT" pitchFamily="18" charset="0"/>
-              </a:rPr>
-              <a:t>Do we need to upgrade our current infrastructure?</a:t>
-            </a:r>
-          </a:p>
-          <a:p>
-            <a:endParaRPr lang="en-US" sz="2400" dirty="0">
-              <a:latin typeface="Calisto MT" pitchFamily="18" charset="0"/>
-            </a:endParaRPr>
-          </a:p>
-        </p:txBody>
-      </p:sp>
-      <p:sp>
-        <p:nvSpPr>
-          <p:cNvPr id="6" name="TextBox 5">
-            <a:extLst>
-              <a:ext uri="{FF2B5EF4-FFF2-40B4-BE49-F238E27FC236}">
-                <a16:creationId xmlns:a16="http://schemas.microsoft.com/office/drawing/2014/main" id="{CBA95C78-7784-4976-9D51-7181A7C2A85A}"/>
-              </a:ext>
-            </a:extLst>
-          </p:cNvPr>
-          <p:cNvSpPr txBox="1"/>
-          <p:nvPr/>
-        </p:nvSpPr>
-        <p:spPr>
-          <a:xfrm>
-            <a:off x="533400" y="5956240"/>
-            <a:ext cx="7696200" cy="400110"/>
-          </a:xfrm>
-          <a:prstGeom prst="rect">
-            <a:avLst/>
-          </a:prstGeom>
-          <a:solidFill>
-            <a:srgbClr val="FFC000"/>
-          </a:solidFill>
-        </p:spPr>
-        <p:txBody>
-          <a:bodyPr wrap="square" rtlCol="0">
-            <a:spAutoFit/>
-          </a:bodyPr>
-          <a:lstStyle/>
-          <a:p>
-            <a:pPr algn="ctr"/>
-            <a:r>
-              <a:rPr lang="en-US" sz="2000" dirty="0">
-                <a:latin typeface="Calisto MT" panose="02040603050505030304" pitchFamily="18" charset="0"/>
-              </a:rPr>
-              <a:t>An engineer’s responsibility is under scrutiny if things go wrong.</a:t>
-            </a:r>
+              <a:t>. </a:t>
+            </a:r>
+          </a:p>
+          <a:p>
+            <a:endParaRPr lang="en-US" dirty="0"/>
           </a:p>
         </p:txBody>
       </p:sp>
     </p:spTree>
     <p:extLst>
       <p:ext uri="{BB962C8B-B14F-4D97-AF65-F5344CB8AC3E}">
-        <p14:creationId xmlns:p14="http://schemas.microsoft.com/office/powerpoint/2010/main" val="2491821266"/>
+        <p14:creationId xmlns:p14="http://schemas.microsoft.com/office/powerpoint/2010/main" val="286214563"/>
       </p:ext>
     </p:extLst>
   </p:cSld>
@@ -11844,12 +11828,14 @@
         </p:nvSpPr>
         <p:spPr/>
         <p:txBody>
-          <a:bodyPr/>
+          <a:bodyPr>
+            <a:normAutofit fontScale="90000"/>
+          </a:bodyPr>
           <a:lstStyle/>
           <a:p>
             <a:r>
               <a:rPr lang="en-US" dirty="0"/>
-              <a:t>Risk Based Design</a:t>
+              <a:t>Examples of things that can go wrong</a:t>
             </a:r>
           </a:p>
         </p:txBody>
@@ -11879,7 +11865,7 @@
               <a:pPr/>
               <a:t>10/2/2024</a:t>
             </a:fld>
-            <a:endParaRPr lang="en-US"/>
+            <a:endParaRPr lang="en-US" dirty="0"/>
           </a:p>
         </p:txBody>
       </p:sp>
@@ -11907,193 +11893,6 @@
               <a:rPr lang="en-US" dirty="0" smtClean="0"/>
               <a:pPr/>
               <a:t>7</a:t>
-            </a:fld>
-            <a:endParaRPr lang="en-US" dirty="0"/>
-          </a:p>
-        </p:txBody>
-      </p:sp>
-      <p:sp>
-        <p:nvSpPr>
-          <p:cNvPr id="5" name="Content Placeholder 4"/>
-          <p:cNvSpPr>
-            <a:spLocks noGrp="1"/>
-          </p:cNvSpPr>
-          <p:nvPr>
-            <p:ph sz="quarter" idx="1"/>
-          </p:nvPr>
-        </p:nvSpPr>
-        <p:spPr>
-          <a:xfrm>
-            <a:off x="612648" y="1524000"/>
-            <a:ext cx="7540752" cy="4632960"/>
-          </a:xfrm>
-        </p:spPr>
-        <p:txBody>
-          <a:bodyPr/>
-          <a:lstStyle/>
-          <a:p>
-            <a:r>
-              <a:rPr lang="en-US" dirty="0">
-                <a:latin typeface="Calisto MT" pitchFamily="18" charset="0"/>
-              </a:rPr>
-              <a:t>A risk based design of an engineering project involves </a:t>
-            </a:r>
-            <a:r>
-              <a:rPr lang="en-US" dirty="0">
-                <a:solidFill>
-                  <a:srgbClr val="0070C0"/>
-                </a:solidFill>
-                <a:latin typeface="Calisto MT" pitchFamily="18" charset="0"/>
-              </a:rPr>
-              <a:t>making decisions </a:t>
-            </a:r>
-            <a:r>
-              <a:rPr lang="en-US" dirty="0">
-                <a:latin typeface="Calisto MT" pitchFamily="18" charset="0"/>
-              </a:rPr>
-              <a:t>based on quantitative risk-benefit trade offs. </a:t>
-            </a:r>
-          </a:p>
-          <a:p>
-            <a:endParaRPr lang="en-US" dirty="0">
-              <a:latin typeface="Calisto MT" pitchFamily="18" charset="0"/>
-            </a:endParaRPr>
-          </a:p>
-          <a:p>
-            <a:r>
-              <a:rPr lang="en-US" dirty="0">
-                <a:latin typeface="Calisto MT" pitchFamily="18" charset="0"/>
-              </a:rPr>
-              <a:t>This involves applying the concepts and methods of </a:t>
-            </a:r>
-            <a:r>
-              <a:rPr lang="en-US" dirty="0">
-                <a:solidFill>
-                  <a:srgbClr val="FF0000"/>
-                </a:solidFill>
-                <a:latin typeface="Calisto MT" pitchFamily="18" charset="0"/>
-              </a:rPr>
-              <a:t>probability and statistics</a:t>
-            </a:r>
-            <a:r>
-              <a:rPr lang="en-US" dirty="0">
-                <a:latin typeface="Calisto MT" pitchFamily="18" charset="0"/>
-              </a:rPr>
-              <a:t>. </a:t>
-            </a:r>
-          </a:p>
-          <a:p>
-            <a:endParaRPr lang="en-US" dirty="0"/>
-          </a:p>
-        </p:txBody>
-      </p:sp>
-    </p:spTree>
-    <p:extLst>
-      <p:ext uri="{BB962C8B-B14F-4D97-AF65-F5344CB8AC3E}">
-        <p14:creationId xmlns:p14="http://schemas.microsoft.com/office/powerpoint/2010/main" val="286214563"/>
-      </p:ext>
-    </p:extLst>
-  </p:cSld>
-  <p:clrMapOvr>
-    <a:masterClrMapping/>
-  </p:clrMapOvr>
-</p:sld>
-</file>
-
-<file path=ppt/slides/slide8.xml><?xml version="1.0" encoding="utf-8"?>
-<p:sld xmlns:a="http://schemas.openxmlformats.org/drawingml/2006/main" xmlns:r="http://schemas.openxmlformats.org/officeDocument/2006/relationships" xmlns:p="http://schemas.openxmlformats.org/presentationml/2006/main">
-  <p:cSld>
-    <p:spTree>
-      <p:nvGrpSpPr>
-        <p:cNvPr id="1" name=""/>
-        <p:cNvGrpSpPr/>
-        <p:nvPr/>
-      </p:nvGrpSpPr>
-      <p:grpSpPr>
-        <a:xfrm>
-          <a:off x="0" y="0"/>
-          <a:ext cx="0" cy="0"/>
-          <a:chOff x="0" y="0"/>
-          <a:chExt cx="0" cy="0"/>
-        </a:xfrm>
-      </p:grpSpPr>
-      <p:sp>
-        <p:nvSpPr>
-          <p:cNvPr id="2" name="Title 1"/>
-          <p:cNvSpPr>
-            <a:spLocks noGrp="1"/>
-          </p:cNvSpPr>
-          <p:nvPr>
-            <p:ph type="title"/>
-          </p:nvPr>
-        </p:nvSpPr>
-        <p:spPr/>
-        <p:txBody>
-          <a:bodyPr>
-            <a:normAutofit fontScale="90000"/>
-          </a:bodyPr>
-          <a:lstStyle/>
-          <a:p>
-            <a:r>
-              <a:rPr lang="en-US" dirty="0"/>
-              <a:t>Examples of things that can go wrong</a:t>
-            </a:r>
-          </a:p>
-        </p:txBody>
-      </p:sp>
-      <p:sp>
-        <p:nvSpPr>
-          <p:cNvPr id="3" name="Date Placeholder 2"/>
-          <p:cNvSpPr>
-            <a:spLocks noGrp="1"/>
-          </p:cNvSpPr>
-          <p:nvPr>
-            <p:ph type="dt" sz="half" idx="10"/>
-          </p:nvPr>
-        </p:nvSpPr>
-        <p:spPr>
-          <a:xfrm>
-            <a:off x="6400800" y="6356350"/>
-            <a:ext cx="2289048" cy="365760"/>
-          </a:xfrm>
-        </p:spPr>
-        <p:txBody>
-          <a:bodyPr/>
-          <a:lstStyle/>
-          <a:p>
-            <a:fld id="{F3563AE4-DA3B-43C7-9491-93F20296CE92}" type="datetime1">
-              <a:rPr lang="en-US" smtClean="0"/>
-              <a:pPr/>
-              <a:t>10/2/2024</a:t>
-            </a:fld>
-            <a:endParaRPr lang="en-US" dirty="0"/>
-          </a:p>
-        </p:txBody>
-      </p:sp>
-      <p:sp>
-        <p:nvSpPr>
-          <p:cNvPr id="4" name="Slide Number Placeholder 3"/>
-          <p:cNvSpPr>
-            <a:spLocks noGrp="1"/>
-          </p:cNvSpPr>
-          <p:nvPr>
-            <p:ph type="sldNum" sz="quarter" idx="12"/>
-          </p:nvPr>
-        </p:nvSpPr>
-        <p:spPr>
-          <a:xfrm>
-            <a:off x="612648" y="6356350"/>
-            <a:ext cx="1981200" cy="365760"/>
-          </a:xfrm>
-        </p:spPr>
-        <p:txBody>
-          <a:bodyPr/>
-          <a:lstStyle/>
-          <a:p>
-            <a:fld id="{8CB62BB1-93B2-41D9-A860-4B60755F311C}" type="slidenum">
-              <a:rPr lang="en-US" dirty="0" smtClean="0"/>
-              <a:pPr/>
-              <a:t>8</a:t>
             </a:fld>
             <a:endParaRPr lang="en-US" dirty="0"/>
           </a:p>

</xml_diff>